<commit_message>
All figures are updated
</commit_message>
<xml_diff>
--- a/Labels/labels.pptx
+++ b/Labels/labels.pptx
@@ -23380,8 +23380,8 @@
         </p:nvSpPr>
         <p:spPr>
           <a:xfrm>
-            <a:off x="3483432" y="5029200"/>
-            <a:ext cx="5212774" cy="1754326"/>
+            <a:off x="3419857" y="5029200"/>
+            <a:ext cx="5339924" cy="1754326"/>
           </a:xfrm>
           <a:prstGeom prst="rect">
             <a:avLst/>
@@ -23400,7 +23400,7 @@
                 <a:latin typeface="Arial" panose="020B0604020202020204" pitchFamily="34" charset="0"/>
                 <a:cs typeface="Arial" panose="020B0604020202020204" pitchFamily="34" charset="0"/>
               </a:rPr>
-              <a:t>Y-PHYS</a:t>
+              <a:t>X-PHYS</a:t>
             </a:r>
           </a:p>
         </p:txBody>
@@ -24340,8 +24340,8 @@
         </p:nvSpPr>
         <p:spPr>
           <a:xfrm>
-            <a:off x="3521103" y="5029200"/>
-            <a:ext cx="5137433" cy="1754326"/>
+            <a:off x="3457528" y="5029200"/>
+            <a:ext cx="5264583" cy="1754326"/>
           </a:xfrm>
           <a:prstGeom prst="rect">
             <a:avLst/>
@@ -24360,7 +24360,7 @@
                 <a:latin typeface="Arial" panose="020B0604020202020204" pitchFamily="34" charset="0"/>
                 <a:cs typeface="Arial" panose="020B0604020202020204" pitchFamily="34" charset="0"/>
               </a:rPr>
-              <a:t>Y-DHAL</a:t>
+              <a:t>X-DHAL</a:t>
             </a:r>
           </a:p>
         </p:txBody>
@@ -27712,8 +27712,8 @@
         </p:nvSpPr>
         <p:spPr>
           <a:xfrm>
-            <a:off x="2803504" y="5029200"/>
-            <a:ext cx="6572633" cy="1754326"/>
+            <a:off x="2841174" y="5029200"/>
+            <a:ext cx="6497292" cy="1754326"/>
           </a:xfrm>
           <a:prstGeom prst="rect">
             <a:avLst/>
@@ -27732,7 +27732,7 @@
                 <a:latin typeface="Arial" panose="020B0604020202020204" pitchFamily="34" charset="0"/>
                 <a:cs typeface="Arial" panose="020B0604020202020204" pitchFamily="34" charset="0"/>
               </a:rPr>
-              <a:t>X-PHYS-2</a:t>
+              <a:t>X-DHAL-2</a:t>
             </a:r>
           </a:p>
         </p:txBody>

</xml_diff>